<commit_message>
undo data layout for sho_toosl::construct_label_table
</commit_message>
<xml_diff>
--- a/doc/big_picture.pptx
+++ b/doc/big_picture.pptx
@@ -208,7 +208,7 @@
           <a:p>
             <a:fld id="{0FF26850-8575-9945-A6DF-A0798D281566}" type="datetimeFigureOut">
               <a:rPr lang="de-DE" smtClean="0"/>
-              <a:t>22.12.19</a:t>
+              <a:t>05.02.20</a:t>
             </a:fld>
             <a:endParaRPr lang="de-DE"/>
           </a:p>
@@ -1228,7 +1228,7 @@
           <a:p>
             <a:fld id="{60A3E910-B59F-F444-BE29-3A643468020D}" type="datetimeFigureOut">
               <a:rPr lang="de-DE" smtClean="0"/>
-              <a:t>22.12.19</a:t>
+              <a:t>05.02.20</a:t>
             </a:fld>
             <a:endParaRPr lang="de-DE"/>
           </a:p>
@@ -1398,7 +1398,7 @@
           <a:p>
             <a:fld id="{60A3E910-B59F-F444-BE29-3A643468020D}" type="datetimeFigureOut">
               <a:rPr lang="de-DE" smtClean="0"/>
-              <a:t>22.12.19</a:t>
+              <a:t>05.02.20</a:t>
             </a:fld>
             <a:endParaRPr lang="de-DE"/>
           </a:p>
@@ -1578,7 +1578,7 @@
           <a:p>
             <a:fld id="{60A3E910-B59F-F444-BE29-3A643468020D}" type="datetimeFigureOut">
               <a:rPr lang="de-DE" smtClean="0"/>
-              <a:t>22.12.19</a:t>
+              <a:t>05.02.20</a:t>
             </a:fld>
             <a:endParaRPr lang="de-DE"/>
           </a:p>
@@ -1748,7 +1748,7 @@
           <a:p>
             <a:fld id="{60A3E910-B59F-F444-BE29-3A643468020D}" type="datetimeFigureOut">
               <a:rPr lang="de-DE" smtClean="0"/>
-              <a:t>22.12.19</a:t>
+              <a:t>05.02.20</a:t>
             </a:fld>
             <a:endParaRPr lang="de-DE"/>
           </a:p>
@@ -1992,7 +1992,7 @@
           <a:p>
             <a:fld id="{60A3E910-B59F-F444-BE29-3A643468020D}" type="datetimeFigureOut">
               <a:rPr lang="de-DE" smtClean="0"/>
-              <a:t>22.12.19</a:t>
+              <a:t>05.02.20</a:t>
             </a:fld>
             <a:endParaRPr lang="de-DE"/>
           </a:p>
@@ -2224,7 +2224,7 @@
           <a:p>
             <a:fld id="{60A3E910-B59F-F444-BE29-3A643468020D}" type="datetimeFigureOut">
               <a:rPr lang="de-DE" smtClean="0"/>
-              <a:t>22.12.19</a:t>
+              <a:t>05.02.20</a:t>
             </a:fld>
             <a:endParaRPr lang="de-DE"/>
           </a:p>
@@ -2591,7 +2591,7 @@
           <a:p>
             <a:fld id="{60A3E910-B59F-F444-BE29-3A643468020D}" type="datetimeFigureOut">
               <a:rPr lang="de-DE" smtClean="0"/>
-              <a:t>22.12.19</a:t>
+              <a:t>05.02.20</a:t>
             </a:fld>
             <a:endParaRPr lang="de-DE"/>
           </a:p>
@@ -2709,7 +2709,7 @@
           <a:p>
             <a:fld id="{60A3E910-B59F-F444-BE29-3A643468020D}" type="datetimeFigureOut">
               <a:rPr lang="de-DE" smtClean="0"/>
-              <a:t>22.12.19</a:t>
+              <a:t>05.02.20</a:t>
             </a:fld>
             <a:endParaRPr lang="de-DE"/>
           </a:p>
@@ -2804,7 +2804,7 @@
           <a:p>
             <a:fld id="{60A3E910-B59F-F444-BE29-3A643468020D}" type="datetimeFigureOut">
               <a:rPr lang="de-DE" smtClean="0"/>
-              <a:t>22.12.19</a:t>
+              <a:t>05.02.20</a:t>
             </a:fld>
             <a:endParaRPr lang="de-DE"/>
           </a:p>
@@ -3081,7 +3081,7 @@
           <a:p>
             <a:fld id="{60A3E910-B59F-F444-BE29-3A643468020D}" type="datetimeFigureOut">
               <a:rPr lang="de-DE" smtClean="0"/>
-              <a:t>22.12.19</a:t>
+              <a:t>05.02.20</a:t>
             </a:fld>
             <a:endParaRPr lang="de-DE"/>
           </a:p>
@@ -3338,7 +3338,7 @@
           <a:p>
             <a:fld id="{60A3E910-B59F-F444-BE29-3A643468020D}" type="datetimeFigureOut">
               <a:rPr lang="de-DE" smtClean="0"/>
-              <a:t>22.12.19</a:t>
+              <a:t>05.02.20</a:t>
             </a:fld>
             <a:endParaRPr lang="de-DE"/>
           </a:p>
@@ -3551,7 +3551,7 @@
           <a:p>
             <a:fld id="{60A3E910-B59F-F444-BE29-3A643468020D}" type="datetimeFigureOut">
               <a:rPr lang="de-DE" smtClean="0"/>
-              <a:t>22.12.19</a:t>
+              <a:t>05.02.20</a:t>
             </a:fld>
             <a:endParaRPr lang="de-DE"/>
           </a:p>
@@ -4264,13 +4264,13 @@
           <a:p>
             <a:pPr algn="ctr"/>
             <a:r>
-              <a:rPr lang="de-DE" sz="1200" dirty="0" err="1">
+              <a:rPr lang="de-DE" sz="1200" dirty="0">
                 <a:solidFill>
                   <a:schemeClr val="tx1"/>
                 </a:solidFill>
                 <a:latin typeface="Courier" pitchFamily="2" charset="0"/>
               </a:rPr>
-              <a:t>spherical</a:t>
+              <a:t>potential</a:t>
             </a:r>
             <a:br>
               <a:rPr lang="de-DE" sz="1200" dirty="0">
@@ -4287,7 +4287,7 @@
                 </a:solidFill>
                 <a:latin typeface="Courier" pitchFamily="2" charset="0"/>
               </a:rPr>
-              <a:t>atoms</a:t>
+              <a:t>generator</a:t>
             </a:r>
             <a:endParaRPr lang="de-DE" sz="1200" dirty="0">
               <a:solidFill>
@@ -7697,10 +7697,10 @@
       </p:grpSp>
       <p:sp>
         <p:nvSpPr>
-          <p:cNvPr id="157" name="Rounded Rectangular Callout 156">
+          <p:cNvPr id="67" name="Rounded Rectangle 66">
             <a:extLst>
               <a:ext uri="{FF2B5EF4-FFF2-40B4-BE49-F238E27FC236}">
-                <a16:creationId xmlns:a16="http://schemas.microsoft.com/office/drawing/2014/main" id="{81874243-837E-3C43-8671-B879C5CF7F81}"/>
+                <a16:creationId xmlns:a16="http://schemas.microsoft.com/office/drawing/2014/main" id="{29D7D188-8CCC-954E-804B-6611A99A8F65}"/>
               </a:ext>
             </a:extLst>
           </p:cNvPr>
@@ -7709,16 +7709,13 @@
         </p:nvSpPr>
         <p:spPr>
           <a:xfrm>
-            <a:off x="4873084" y="4694980"/>
-            <a:ext cx="896342" cy="230457"/>
+            <a:off x="5665695" y="7448382"/>
+            <a:ext cx="1260000" cy="540000"/>
           </a:xfrm>
-          <a:prstGeom prst="wedgeRoundRectCallout">
-            <a:avLst>
-              <a:gd name="adj1" fmla="val -20833"/>
-              <a:gd name="adj2" fmla="val 132520"/>
-              <a:gd name="adj3" fmla="val 16667"/>
-            </a:avLst>
+          <a:prstGeom prst="roundRect">
+            <a:avLst/>
           </a:prstGeom>
+          <a:noFill/>
         </p:spPr>
         <p:style>
           <a:lnRef idx="2">
@@ -7743,18 +7740,36 @@
             <a:pPr algn="ctr"/>
             <a:r>
               <a:rPr lang="de-DE" sz="1200" dirty="0" err="1">
-                <a:latin typeface="Arial" panose="020B0604020202020204" pitchFamily="34" charset="0"/>
-                <a:cs typeface="Arial" panose="020B0604020202020204" pitchFamily="34" charset="0"/>
+                <a:solidFill>
+                  <a:schemeClr val="tx1"/>
+                </a:solidFill>
+                <a:latin typeface="Courier" pitchFamily="2" charset="0"/>
               </a:rPr>
-              <a:t>rename</a:t>
-            </a:r>
-            <a:r>
+              <a:t>conjugate</a:t>
+            </a:r>
+            <a:br>
               <a:rPr lang="de-DE" sz="1200" dirty="0">
-                <a:latin typeface="Arial" panose="020B0604020202020204" pitchFamily="34" charset="0"/>
-                <a:cs typeface="Arial" panose="020B0604020202020204" pitchFamily="34" charset="0"/>
+                <a:solidFill>
+                  <a:schemeClr val="tx1"/>
+                </a:solidFill>
+                <a:latin typeface="Courier" pitchFamily="2" charset="0"/>
               </a:rPr>
-              <a:t>?</a:t>
-            </a:r>
+            </a:br>
+            <a:r>
+              <a:rPr lang="de-DE" sz="1200" dirty="0" err="1">
+                <a:solidFill>
+                  <a:schemeClr val="tx1"/>
+                </a:solidFill>
+                <a:latin typeface="Courier" pitchFamily="2" charset="0"/>
+              </a:rPr>
+              <a:t>gradients</a:t>
+            </a:r>
+            <a:endParaRPr lang="de-DE" sz="1200" dirty="0">
+              <a:solidFill>
+                <a:schemeClr val="tx1"/>
+              </a:solidFill>
+              <a:latin typeface="Courier" pitchFamily="2" charset="0"/>
+            </a:endParaRPr>
           </a:p>
         </p:txBody>
       </p:sp>

</xml_diff>